<commit_message>
Fixes on recursive algo and backtracking slides
</commit_message>
<xml_diff>
--- a/Courses/Software-Sciences/Module-2-DS-and-Algo/16-Recursive-Algo-Backtracking/16-Recursive-Algo-Backtracking.pptx
+++ b/Courses/Software-Sciences/Module-2-DS-and-Algo/16-Recursive-Algo-Backtracking/16-Recursive-Algo-Backtracking.pptx
@@ -1736,51 +1736,6 @@
         </a:p>
       </dgm:t>
     </dgm:pt>
-    <dgm:pt modelId="{348A69EE-2A56-4C3B-8186-E574930F8D73}">
-      <dgm:prSet phldrT="[Text]"/>
-      <dgm:spPr>
-        <a:noFill/>
-        <a:ln>
-          <a:noFill/>
-        </a:ln>
-      </dgm:spPr>
-      <dgm:t>
-        <a:bodyPr/>
-        <a:lstStyle/>
-        <a:p>
-          <a:r>
-            <a:rPr lang="en-US" dirty="0">
-              <a:solidFill>
-                <a:schemeClr val="bg1"/>
-              </a:solidFill>
-            </a:rPr>
-            <a:t>Recurre</a:t>
-          </a:r>
-        </a:p>
-      </dgm:t>
-    </dgm:pt>
-    <dgm:pt modelId="{1277244B-9356-44FC-89C9-AA658B0722F9}" type="parTrans" cxnId="{D0EB790B-98E1-442B-933B-FCFA77344E1C}">
-      <dgm:prSet/>
-      <dgm:spPr/>
-      <dgm:t>
-        <a:bodyPr/>
-        <a:lstStyle/>
-        <a:p>
-          <a:endParaRPr lang="en-US"/>
-        </a:p>
-      </dgm:t>
-    </dgm:pt>
-    <dgm:pt modelId="{5CA9BAE4-6026-4EBA-ABB1-5CBFE6B793F2}" type="sibTrans" cxnId="{D0EB790B-98E1-442B-933B-FCFA77344E1C}">
-      <dgm:prSet/>
-      <dgm:spPr/>
-      <dgm:t>
-        <a:bodyPr/>
-        <a:lstStyle/>
-        <a:p>
-          <a:endParaRPr lang="en-US"/>
-        </a:p>
-      </dgm:t>
-    </dgm:pt>
     <dgm:pt modelId="{C79375B6-2DF5-43D9-9A86-01A8E7207F5E}">
       <dgm:prSet phldrT="[Text]"/>
       <dgm:spPr/>
@@ -1811,6 +1766,48 @@
       </dgm:t>
     </dgm:pt>
     <dgm:pt modelId="{C09583EF-B600-473A-882F-0289C19E9120}" type="sibTrans" cxnId="{2672E83D-C823-48E6-BB37-BE074B86636D}">
+      <dgm:prSet/>
+      <dgm:spPr/>
+      <dgm:t>
+        <a:bodyPr/>
+        <a:lstStyle/>
+        <a:p>
+          <a:endParaRPr lang="en-US"/>
+        </a:p>
+      </dgm:t>
+    </dgm:pt>
+    <dgm:pt modelId="{348A69EE-2A56-4C3B-8186-E574930F8D73}">
+      <dgm:prSet phldrT="[Text]"/>
+      <dgm:spPr>
+        <a:noFill/>
+        <a:ln>
+          <a:noFill/>
+        </a:ln>
+      </dgm:spPr>
+      <dgm:t>
+        <a:bodyPr/>
+        <a:lstStyle/>
+        <a:p>
+          <a:endParaRPr lang="en-US" dirty="0">
+            <a:solidFill>
+              <a:schemeClr val="bg1"/>
+            </a:solidFill>
+          </a:endParaRPr>
+        </a:p>
+      </dgm:t>
+    </dgm:pt>
+    <dgm:pt modelId="{5CA9BAE4-6026-4EBA-ABB1-5CBFE6B793F2}" type="sibTrans" cxnId="{D0EB790B-98E1-442B-933B-FCFA77344E1C}">
+      <dgm:prSet/>
+      <dgm:spPr/>
+      <dgm:t>
+        <a:bodyPr/>
+        <a:lstStyle/>
+        <a:p>
+          <a:endParaRPr lang="en-US"/>
+        </a:p>
+      </dgm:t>
+    </dgm:pt>
+    <dgm:pt modelId="{1277244B-9356-44FC-89C9-AA658B0722F9}" type="parTrans" cxnId="{D0EB790B-98E1-442B-933B-FCFA77344E1C}">
       <dgm:prSet/>
       <dgm:spPr/>
       <dgm:t>
@@ -2345,9 +2342,9 @@
     <dgm:cxn modelId="{AD849125-9433-4E3D-91D7-24B36E804ADE}" type="presOf" srcId="{7888D73B-A773-418E-95E8-DC842AAECA7C}" destId="{9E0A144C-4344-4D4D-836C-B3C166E569B1}" srcOrd="1" destOrd="0" presId="urn:microsoft.com/office/officeart/2005/8/layout/radial1"/>
     <dgm:cxn modelId="{AD7CB034-F48B-452E-B6B2-F1D5F98A105A}" srcId="{CCF3BD0A-9E42-45D5-AB9A-8721302E20E8}" destId="{FC6B4275-CFA0-4CC7-81BE-4DF6C79883A3}" srcOrd="0" destOrd="0" parTransId="{E9600514-A53D-404A-A8B6-0138B51D9268}" sibTransId="{C737D060-541F-47EC-9FFD-765C1DF89AFF}"/>
     <dgm:cxn modelId="{36B5D437-4CBC-4AE5-B475-010B60DBF6CB}" type="presOf" srcId="{39D2180B-B33B-40C5-AD59-5A98CAF03B99}" destId="{5552192D-62D4-4B45-80BE-C6EE974793DD}" srcOrd="0" destOrd="0" presId="urn:microsoft.com/office/officeart/2005/8/layout/radial1"/>
-    <dgm:cxn modelId="{8EFE4863-0BE3-4AB5-B038-2D5AB198B761}" type="presOf" srcId="{DCC389B9-4FB5-459B-8B35-AAD20D5BBCA7}" destId="{77D4084E-7865-41B3-85F7-92D20829E2A1}" srcOrd="0" destOrd="0" presId="urn:microsoft.com/office/officeart/2005/8/layout/radial1"/>
     <dgm:cxn modelId="{BBB28148-A54C-45FD-9870-BD2559E4BCDB}" srcId="{CCF3BD0A-9E42-45D5-AB9A-8721302E20E8}" destId="{DCC389B9-4FB5-459B-8B35-AAD20D5BBCA7}" srcOrd="3" destOrd="0" parTransId="{D9A09114-D47C-468C-A656-E5590C2F00D9}" sibTransId="{592D477C-EA6D-477B-A459-8F64BD91A5F9}"/>
     <dgm:cxn modelId="{2BFB114A-BDF1-4704-96F0-11E571AE73B4}" srcId="{346A2191-E31B-47C3-A210-FC1E1DB65F2C}" destId="{CCF3BD0A-9E42-45D5-AB9A-8721302E20E8}" srcOrd="0" destOrd="0" parTransId="{28B7F451-4AC7-4E01-AE19-7FFD5C7F5D4C}" sibTransId="{C217C907-890F-44FD-B000-D41BE60B9260}"/>
+    <dgm:cxn modelId="{8EFE4863-0BE3-4AB5-B038-2D5AB198B761}" type="presOf" srcId="{DCC389B9-4FB5-459B-8B35-AAD20D5BBCA7}" destId="{77D4084E-7865-41B3-85F7-92D20829E2A1}" srcOrd="0" destOrd="0" presId="urn:microsoft.com/office/officeart/2005/8/layout/radial1"/>
     <dgm:cxn modelId="{F4FF6076-91A1-4D7F-B7B5-29D121FF2D84}" type="presOf" srcId="{E9600514-A53D-404A-A8B6-0138B51D9268}" destId="{82A020A5-E374-4478-85D6-54078319851F}" srcOrd="1" destOrd="0" presId="urn:microsoft.com/office/officeart/2005/8/layout/radial1"/>
     <dgm:cxn modelId="{234E8392-BF76-4169-98F3-84335B4359BE}" type="presOf" srcId="{9A7CE537-4752-46FA-B800-3D22D376531C}" destId="{10B36EE8-494A-448E-84F0-461AF338E222}" srcOrd="0" destOrd="0" presId="urn:microsoft.com/office/officeart/2005/8/layout/radial1"/>
     <dgm:cxn modelId="{01F47FA8-D217-4C81-B23D-73BF3745CA61}" type="presOf" srcId="{D9A09114-D47C-468C-A656-E5590C2F00D9}" destId="{9E43B25D-F4B4-47B1-9988-D89ACC8630BF}" srcOrd="1" destOrd="0" presId="urn:microsoft.com/office/officeart/2005/8/layout/radial1"/>
@@ -2592,14 +2589,11 @@
             </a:spcAft>
             <a:buNone/>
           </a:pPr>
-          <a:r>
-            <a:rPr lang="en-US" sz="1800" kern="1200" dirty="0">
-              <a:solidFill>
-                <a:schemeClr val="bg1"/>
-              </a:solidFill>
-            </a:rPr>
-            <a:t>Recurre</a:t>
-          </a:r>
+          <a:endParaRPr lang="en-US" sz="1800" kern="1200" dirty="0">
+            <a:solidFill>
+              <a:schemeClr val="bg1"/>
+            </a:solidFill>
+          </a:endParaRPr>
         </a:p>
       </dsp:txBody>
       <dsp:txXfrm>
@@ -7954,7 +7948,7 @@
           <a:p>
             <a:fld id="{4E087215-0C8F-4762-A664-737A353EC9A4}" type="datetimeFigureOut">
               <a:rPr lang="bg-BG" smtClean="0"/>
-              <a:t>10.7.2023 г.</a:t>
+              <a:t>9.09.23 г.</a:t>
             </a:fld>
             <a:endParaRPr lang="bg-BG" dirty="0"/>
           </a:p>
@@ -8145,7 +8139,7 @@
           <a:p>
             <a:fld id="{72D84649-876A-46C9-8472-14CB09C070D8}" type="datetimeFigureOut">
               <a:rPr lang="en-US" smtClean="0"/>
-              <a:t>7/10/2023</a:t>
+              <a:t>9/9/23</a:t>
             </a:fld>
             <a:endParaRPr lang="en-US" dirty="0"/>
           </a:p>
@@ -16855,7 +16849,7 @@
           <a:p>
             <a:r>
               <a:rPr lang="bg-BG" sz="3600" dirty="0"/>
-              <a:t>Как работи обратното връщаме?</a:t>
+              <a:t>Как работи обратното връщане?</a:t>
             </a:r>
             <a:endParaRPr lang="en-US" sz="3600" dirty="0"/>
           </a:p>
@@ -17084,7 +17078,7 @@
                                         <p:tgtEl>
                                           <p:spTgt spid="6">
                                             <p:txEl>
-                                              <p:pRg st="1" end="1"/>
+                                              <p:pRg st="2" end="2"/>
                                             </p:txEl>
                                           </p:spTgt>
                                         </p:tgtEl>
@@ -17126,55 +17120,6 @@
                                     <p:set>
                                       <p:cBhvr>
                                         <p:cTn id="10" dur="1" fill="hold">
-                                          <p:stCondLst>
-                                            <p:cond delay="0"/>
-                                          </p:stCondLst>
-                                        </p:cTn>
-                                        <p:tgtEl>
-                                          <p:spTgt spid="6">
-                                            <p:txEl>
-                                              <p:pRg st="2" end="2"/>
-                                            </p:txEl>
-                                          </p:spTgt>
-                                        </p:tgtEl>
-                                        <p:attrNameLst>
-                                          <p:attrName>style.visibility</p:attrName>
-                                        </p:attrNameLst>
-                                      </p:cBhvr>
-                                      <p:to>
-                                        <p:strVal val="visible"/>
-                                      </p:to>
-                                    </p:set>
-                                  </p:childTnLst>
-                                </p:cTn>
-                              </p:par>
-                            </p:childTnLst>
-                          </p:cTn>
-                        </p:par>
-                      </p:childTnLst>
-                    </p:cTn>
-                  </p:par>
-                  <p:par>
-                    <p:cTn id="11" fill="hold">
-                      <p:stCondLst>
-                        <p:cond delay="indefinite"/>
-                      </p:stCondLst>
-                      <p:childTnLst>
-                        <p:par>
-                          <p:cTn id="12" fill="hold">
-                            <p:stCondLst>
-                              <p:cond delay="0"/>
-                            </p:stCondLst>
-                            <p:childTnLst>
-                              <p:par>
-                                <p:cTn id="13" presetID="1" presetClass="entr" presetSubtype="0" fill="hold" nodeType="clickEffect">
-                                  <p:stCondLst>
-                                    <p:cond delay="0"/>
-                                  </p:stCondLst>
-                                  <p:childTnLst>
-                                    <p:set>
-                                      <p:cBhvr>
-                                        <p:cTn id="14" dur="1" fill="hold">
                                           <p:stCondLst>
                                             <p:cond delay="0"/>
                                           </p:stCondLst>
@@ -18273,7 +18218,7 @@
             </a:pPr>
             <a:r>
               <a:rPr lang="bg-BG" dirty="0"/>
-              <a:t>Напишете програма, която намира всички възможни места да постави:</a:t>
+              <a:t>Напишете програма, която намира всички възможни места, така че да:</a:t>
             </a:r>
             <a:endParaRPr lang="en-US" dirty="0"/>
           </a:p>
@@ -18287,6 +18232,10 @@
               </a:buClr>
             </a:pPr>
             <a:r>
+              <a:rPr lang="bg-BG" dirty="0"/>
+              <a:t>Постави </a:t>
+            </a:r>
+            <a:r>
               <a:rPr lang="bg-BG" b="1" dirty="0">
                 <a:solidFill>
                   <a:schemeClr val="bg1"/>
@@ -18321,12 +18270,35 @@
               <a:lnSpc>
                 <a:spcPct val="100000"/>
               </a:lnSpc>
+              <a:buClr>
+                <a:schemeClr val="tx1"/>
+              </a:buClr>
             </a:pPr>
             <a:r>
+              <a:rPr lang="bg-BG" b="1" dirty="0">
+                <a:solidFill>
+                  <a:schemeClr val="bg1"/>
+                </a:solidFill>
+              </a:rPr>
+              <a:t>Не може </a:t>
+            </a:r>
+            <a:r>
               <a:rPr lang="bg-BG" dirty="0"/>
-              <a:t>Така че да не може две царици да се атакуват</a:t>
-            </a:r>
-            <a:endParaRPr lang="en-US" dirty="0"/>
+              <a:t>две царици да се </a:t>
+            </a:r>
+            <a:r>
+              <a:rPr lang="bg-BG" b="1" dirty="0">
+                <a:solidFill>
+                  <a:schemeClr val="bg1"/>
+                </a:solidFill>
+              </a:rPr>
+              <a:t>атакуват</a:t>
+            </a:r>
+            <a:endParaRPr lang="en-US" b="1" dirty="0">
+              <a:solidFill>
+                <a:schemeClr val="bg1"/>
+              </a:solidFill>
+            </a:endParaRPr>
           </a:p>
           <a:p>
             <a:pPr>
@@ -18375,15 +18347,15 @@
           <a:p>
             <a:r>
               <a:rPr lang="bg-BG" dirty="0"/>
-              <a:t>Пъзелът</a:t>
+              <a:t>Задача: Пъзелът</a:t>
             </a:r>
             <a:r>
               <a:rPr lang="en-US" dirty="0"/>
-              <a:t> „</a:t>
+              <a:t> </a:t>
             </a:r>
             <a:r>
               <a:rPr lang="bg-BG" dirty="0"/>
-              <a:t>8 кралици</a:t>
+              <a:t>"8 кралици</a:t>
             </a:r>
             <a:r>
               <a:rPr lang="en-US" dirty="0"/>
@@ -18452,7 +18424,7 @@
         </p:nvSpPr>
         <p:spPr>
           <a:xfrm>
-            <a:off x="921000" y="6320612"/>
+            <a:off x="921000" y="6358890"/>
             <a:ext cx="10239908" cy="400110"/>
           </a:xfrm>
           <a:prstGeom prst="rect">
@@ -18563,7 +18535,15 @@
             <a:pPr algn="ctr"/>
             <a:r>
               <a:rPr lang="en-US" sz="2000" dirty="0"/>
-              <a:t>Тествайте решението в Judge</a:t>
+              <a:t>Тествайте решението </a:t>
+            </a:r>
+            <a:r>
+              <a:rPr lang="bg-BG" sz="2000" dirty="0"/>
+              <a:t>си </a:t>
+            </a:r>
+            <a:r>
+              <a:rPr lang="en-US" sz="2000" dirty="0"/>
+              <a:t>в Judge</a:t>
             </a:r>
             <a:r>
               <a:rPr lang="en-US" sz="1999" dirty="0"/>
@@ -18938,8 +18918,8 @@
         </p:nvSpPr>
         <p:spPr>
           <a:xfrm>
-            <a:off x="190402" y="1196125"/>
-            <a:ext cx="5590598" cy="5528766"/>
+            <a:off x="111000" y="1196125"/>
+            <a:ext cx="6265598" cy="5528766"/>
           </a:xfrm>
         </p:spPr>
         <p:txBody>
@@ -18950,30 +18930,11 @@
           <a:p>
             <a:pPr marL="457063" indent="-457063"/>
             <a:r>
-              <a:rPr lang="bg-BG" sz="3400" dirty="0"/>
-              <a:t>Намира всички решения за пъзелът</a:t>
-            </a:r>
-            <a:r>
-              <a:rPr lang="en-US" sz="3400" dirty="0"/>
-              <a:t> „</a:t>
-            </a:r>
-            <a:r>
-              <a:rPr lang="bg-BG" sz="3400" dirty="0"/>
-              <a:t>кралици</a:t>
-            </a:r>
-            <a:r>
-              <a:rPr lang="en-US" sz="3400" dirty="0"/>
-              <a:t> “</a:t>
-            </a:r>
-          </a:p>
-          <a:p>
-            <a:pPr marL="457063" indent="-457063"/>
-            <a:r>
-              <a:rPr lang="bg-BG" sz="3400" dirty="0"/>
+              <a:rPr lang="bg-BG" sz="3800" dirty="0"/>
               <a:t>За всяка стъпка</a:t>
             </a:r>
             <a:r>
-              <a:rPr lang="en-US" sz="3400" dirty="0"/>
+              <a:rPr lang="en-US" sz="3800" dirty="0"/>
               <a:t>:</a:t>
             </a:r>
           </a:p>
@@ -18984,18 +18945,18 @@
               </a:buClr>
             </a:pPr>
             <a:r>
-              <a:rPr lang="bg-BG" sz="3200" dirty="0"/>
-              <a:t>Проверяваме </a:t>
-            </a:r>
-            <a:r>
-              <a:rPr lang="bg-BG" sz="3200" b="1" dirty="0">
+              <a:rPr lang="bg-BG" sz="3600" dirty="0"/>
+              <a:t>Проверяваме дали може да </a:t>
+            </a:r>
+            <a:r>
+              <a:rPr lang="bg-BG" sz="3600" b="1" dirty="0">
                 <a:solidFill>
                   <a:schemeClr val="bg1"/>
                 </a:solidFill>
               </a:rPr>
-              <a:t>решението</a:t>
-            </a:r>
-            <a:endParaRPr lang="en-US" sz="3200" b="1" dirty="0">
+              <a:t>поставим кралицата</a:t>
+            </a:r>
+            <a:endParaRPr lang="en-US" sz="3600" b="1" dirty="0">
               <a:solidFill>
                 <a:schemeClr val="bg1"/>
               </a:solidFill>
@@ -19008,7 +18969,7 @@
               </a:buClr>
             </a:pPr>
             <a:r>
-              <a:rPr lang="bg-BG" sz="3200" b="1" dirty="0">
+              <a:rPr lang="bg-BG" sz="3600" b="1" dirty="0">
                 <a:solidFill>
                   <a:schemeClr val="bg1"/>
                 </a:solidFill>
@@ -19016,14 +18977,14 @@
               <a:t>Слагаме</a:t>
             </a:r>
             <a:r>
-              <a:rPr lang="en-US" sz="3200" dirty="0"/>
+              <a:rPr lang="en-US" sz="3600" dirty="0"/>
               <a:t> </a:t>
             </a:r>
             <a:r>
-              <a:rPr lang="bg-BG" sz="3200" dirty="0"/>
+              <a:rPr lang="bg-BG" sz="3600" dirty="0"/>
               <a:t>кралицата на свободно място</a:t>
             </a:r>
-            <a:endParaRPr lang="en-US" sz="3200" dirty="0"/>
+            <a:endParaRPr lang="en-US" sz="3600" dirty="0"/>
           </a:p>
           <a:p>
             <a:pPr marL="1066099" lvl="1" indent="-457063">
@@ -19032,18 +18993,18 @@
               </a:buClr>
             </a:pPr>
             <a:r>
-              <a:rPr lang="bg-BG" sz="3200" dirty="0"/>
+              <a:rPr lang="bg-BG" sz="3600" dirty="0"/>
               <a:t>Извикваме </a:t>
             </a:r>
             <a:r>
-              <a:rPr lang="bg-BG" sz="3200" b="1" dirty="0">
+              <a:rPr lang="bg-BG" sz="3600" b="1" dirty="0">
                 <a:solidFill>
                   <a:schemeClr val="bg1"/>
                 </a:solidFill>
               </a:rPr>
               <a:t>рекурсия</a:t>
             </a:r>
-            <a:endParaRPr lang="en-US" sz="3200" dirty="0"/>
+            <a:endParaRPr lang="en-US" sz="3600" dirty="0"/>
           </a:p>
           <a:p>
             <a:pPr marL="1066099" lvl="1" indent="-457063">
@@ -19052,7 +19013,7 @@
               </a:buClr>
             </a:pPr>
             <a:r>
-              <a:rPr lang="bg-BG" sz="3200" b="1" dirty="0">
+              <a:rPr lang="bg-BG" sz="3600" b="1" dirty="0">
                 <a:solidFill>
                   <a:schemeClr val="bg1"/>
                 </a:solidFill>
@@ -19060,14 +19021,14 @@
               <a:t>Премахваме</a:t>
             </a:r>
             <a:r>
-              <a:rPr lang="en-US" sz="3200" dirty="0"/>
+              <a:rPr lang="en-US" sz="3600" dirty="0"/>
               <a:t> </a:t>
             </a:r>
             <a:r>
-              <a:rPr lang="bg-BG" sz="3200" dirty="0"/>
+              <a:rPr lang="bg-BG" sz="3600" dirty="0"/>
               <a:t>кралицата</a:t>
             </a:r>
-            <a:endParaRPr lang="en-US" sz="3200" dirty="0"/>
+            <a:endParaRPr lang="en-US" sz="3600" dirty="0"/>
           </a:p>
         </p:txBody>
       </p:sp>
@@ -19425,11 +19386,11 @@
             </a:r>
             <a:r>
               <a:rPr lang="en-US" dirty="0"/>
-              <a:t> „</a:t>
+              <a:t> </a:t>
             </a:r>
             <a:r>
               <a:rPr lang="bg-BG" dirty="0"/>
-              <a:t>8 кралици</a:t>
+              <a:t>"8 кралици</a:t>
             </a:r>
             <a:r>
               <a:rPr lang="en-US" dirty="0"/>
@@ -19661,55 +19622,6 @@
                       </p:childTnLst>
                     </p:cTn>
                   </p:par>
-                  <p:par>
-                    <p:cTn id="19" fill="hold">
-                      <p:stCondLst>
-                        <p:cond delay="indefinite"/>
-                      </p:stCondLst>
-                      <p:childTnLst>
-                        <p:par>
-                          <p:cTn id="20" fill="hold">
-                            <p:stCondLst>
-                              <p:cond delay="0"/>
-                            </p:stCondLst>
-                            <p:childTnLst>
-                              <p:par>
-                                <p:cTn id="21" presetID="1" presetClass="entr" presetSubtype="0" fill="hold" nodeType="clickEffect">
-                                  <p:stCondLst>
-                                    <p:cond delay="0"/>
-                                  </p:stCondLst>
-                                  <p:childTnLst>
-                                    <p:set>
-                                      <p:cBhvr>
-                                        <p:cTn id="22" dur="1" fill="hold">
-                                          <p:stCondLst>
-                                            <p:cond delay="0"/>
-                                          </p:stCondLst>
-                                        </p:cTn>
-                                        <p:tgtEl>
-                                          <p:spTgt spid="3">
-                                            <p:txEl>
-                                              <p:pRg st="5" end="5"/>
-                                            </p:txEl>
-                                          </p:spTgt>
-                                        </p:tgtEl>
-                                        <p:attrNameLst>
-                                          <p:attrName>style.visibility</p:attrName>
-                                        </p:attrNameLst>
-                                      </p:cBhvr>
-                                      <p:to>
-                                        <p:strVal val="visible"/>
-                                      </p:to>
-                                    </p:set>
-                                  </p:childTnLst>
-                                </p:cTn>
-                              </p:par>
-                            </p:childTnLst>
-                          </p:cTn>
-                        </p:par>
-                      </p:childTnLst>
-                    </p:cTn>
-                  </p:par>
                 </p:childTnLst>
               </p:cTn>
               <p:prevCondLst>
@@ -20094,7 +20006,7 @@
         </p:spPr>
         <p:txBody>
           <a:bodyPr vert="horz" lIns="107944" tIns="35982" rIns="107944" bIns="35982" rtlCol="0">
-            <a:normAutofit fontScale="92500" lnSpcReduction="10000"/>
+            <a:normAutofit/>
           </a:bodyPr>
           <a:lstStyle>
             <a:lvl1pPr marL="456915" indent="-456915" algn="l" defTabSz="1218438" rtl="0" eaLnBrk="1" latinLnBrk="1" hangingPunct="1">
@@ -20301,24 +20213,40 @@
                   <a:schemeClr val="bg2"/>
                 </a:solidFill>
               </a:rPr>
-              <a:t>Използвайте рекурсия да генерирате прости комбинаторни обект </a:t>
-            </a:r>
-          </a:p>
-          <a:p>
-            <a:pPr lvl="1" latinLnBrk="0">
-              <a:buClr>
-                <a:schemeClr val="bg2"/>
-              </a:buClr>
-            </a:pPr>
+              <a:t>Използваме ги, за да генерираме </a:t>
+            </a:r>
+            <a:r>
+              <a:rPr lang="bg-BG" sz="3200" b="1" dirty="0">
+                <a:solidFill>
+                  <a:schemeClr val="bg2"/>
+                </a:solidFill>
+              </a:rPr>
+              <a:t>прости комбинаторни обекти</a:t>
+            </a:r>
             <a:r>
               <a:rPr lang="bg-BG" sz="3200" dirty="0">
                 <a:solidFill>
                   <a:schemeClr val="bg2"/>
                 </a:solidFill>
               </a:rPr>
-              <a:t>Комбинации, вариации, пермутации и други</a:t>
-            </a:r>
-            <a:endParaRPr lang="en-US" sz="3200" dirty="0">
+              <a:t>: </a:t>
+            </a:r>
+          </a:p>
+          <a:p>
+            <a:pPr lvl="2" latinLnBrk="0">
+              <a:buClr>
+                <a:schemeClr val="bg2"/>
+              </a:buClr>
+            </a:pPr>
+            <a:r>
+              <a:rPr lang="bg-BG" sz="3000" dirty="0">
+                <a:solidFill>
+                  <a:schemeClr val="bg2"/>
+                </a:solidFill>
+              </a:rPr>
+              <a:t>Пермутации, комбинации, вариации и други</a:t>
+            </a:r>
+            <a:endParaRPr lang="en-US" sz="3000" dirty="0">
               <a:solidFill>
                 <a:schemeClr val="bg2"/>
               </a:solidFill>
@@ -20362,27 +20290,31 @@
                   <a:schemeClr val="bg2"/>
                 </a:solidFill>
               </a:rPr>
-              <a:t>Използвайте обратно връщане, за да проверите всички възможните на всяка стъпка</a:t>
-            </a:r>
-            <a:endParaRPr lang="en-US" sz="3200" dirty="0">
-              <a:solidFill>
-                <a:schemeClr val="bg2"/>
-              </a:solidFill>
-            </a:endParaRPr>
-          </a:p>
-          <a:p>
-            <a:pPr lvl="1" latinLnBrk="0">
-              <a:buClr>
-                <a:schemeClr val="bg2"/>
-              </a:buClr>
-            </a:pPr>
+              <a:t>Използваме го, за да проверим </a:t>
+            </a:r>
+            <a:r>
+              <a:rPr lang="bg-BG" sz="3200" b="1" dirty="0">
+                <a:solidFill>
+                  <a:schemeClr val="bg2"/>
+                </a:solidFill>
+              </a:rPr>
+              <a:t>всички възможни конфигурации</a:t>
+            </a:r>
             <a:r>
               <a:rPr lang="bg-BG" sz="3200" dirty="0">
                 <a:solidFill>
                   <a:schemeClr val="bg2"/>
                 </a:solidFill>
               </a:rPr>
-              <a:t>Примерно генерирайте всички възможни конфигурации, които отговарят на определен критерии</a:t>
+              <a:t>, които отговарят на определен </a:t>
+            </a:r>
+            <a:r>
+              <a:rPr lang="bg-BG" sz="3200" b="1" dirty="0">
+                <a:solidFill>
+                  <a:schemeClr val="bg2"/>
+                </a:solidFill>
+              </a:rPr>
+              <a:t>критерии</a:t>
             </a:r>
             <a:endParaRPr lang="en-US" sz="3200" b="1" dirty="0">
               <a:solidFill>
@@ -20491,104 +20423,6 @@
                                         <p:tgtEl>
                                           <p:spTgt spid="15">
                                             <p:txEl>
-                                              <p:pRg st="1" end="1"/>
-                                            </p:txEl>
-                                          </p:spTgt>
-                                        </p:tgtEl>
-                                        <p:attrNameLst>
-                                          <p:attrName>style.visibility</p:attrName>
-                                        </p:attrNameLst>
-                                      </p:cBhvr>
-                                      <p:to>
-                                        <p:strVal val="visible"/>
-                                      </p:to>
-                                    </p:set>
-                                  </p:childTnLst>
-                                </p:cTn>
-                              </p:par>
-                            </p:childTnLst>
-                          </p:cTn>
-                        </p:par>
-                      </p:childTnLst>
-                    </p:cTn>
-                  </p:par>
-                  <p:par>
-                    <p:cTn id="7" fill="hold">
-                      <p:stCondLst>
-                        <p:cond delay="indefinite"/>
-                      </p:stCondLst>
-                      <p:childTnLst>
-                        <p:par>
-                          <p:cTn id="8" fill="hold">
-                            <p:stCondLst>
-                              <p:cond delay="0"/>
-                            </p:stCondLst>
-                            <p:childTnLst>
-                              <p:par>
-                                <p:cTn id="9" presetID="1" presetClass="entr" presetSubtype="0" fill="hold" nodeType="clickEffect">
-                                  <p:stCondLst>
-                                    <p:cond delay="0"/>
-                                  </p:stCondLst>
-                                  <p:childTnLst>
-                                    <p:set>
-                                      <p:cBhvr>
-                                        <p:cTn id="10" dur="1" fill="hold">
-                                          <p:stCondLst>
-                                            <p:cond delay="0"/>
-                                          </p:stCondLst>
-                                        </p:cTn>
-                                        <p:tgtEl>
-                                          <p:spTgt spid="15">
-                                            <p:txEl>
-                                              <p:pRg st="2" end="2"/>
-                                            </p:txEl>
-                                          </p:spTgt>
-                                        </p:tgtEl>
-                                        <p:attrNameLst>
-                                          <p:attrName>style.visibility</p:attrName>
-                                        </p:attrNameLst>
-                                      </p:cBhvr>
-                                      <p:to>
-                                        <p:strVal val="visible"/>
-                                      </p:to>
-                                    </p:set>
-                                  </p:childTnLst>
-                                </p:cTn>
-                              </p:par>
-                            </p:childTnLst>
-                          </p:cTn>
-                        </p:par>
-                      </p:childTnLst>
-                    </p:cTn>
-                  </p:par>
-                  <p:par>
-                    <p:cTn id="11" fill="hold">
-                      <p:stCondLst>
-                        <p:cond delay="indefinite"/>
-                      </p:stCondLst>
-                      <p:childTnLst>
-                        <p:par>
-                          <p:cTn id="12" fill="hold">
-                            <p:stCondLst>
-                              <p:cond delay="0"/>
-                            </p:stCondLst>
-                            <p:childTnLst>
-                              <p:par>
-                                <p:cTn id="13" presetID="1" presetClass="entr" presetSubtype="0" fill="hold" nodeType="clickEffect">
-                                  <p:stCondLst>
-                                    <p:cond delay="0"/>
-                                  </p:stCondLst>
-                                  <p:childTnLst>
-                                    <p:set>
-                                      <p:cBhvr>
-                                        <p:cTn id="14" dur="1" fill="hold">
-                                          <p:stCondLst>
-                                            <p:cond delay="0"/>
-                                          </p:stCondLst>
-                                        </p:cTn>
-                                        <p:tgtEl>
-                                          <p:spTgt spid="15">
-                                            <p:txEl>
                                               <p:pRg st="3" end="3"/>
                                             </p:txEl>
                                           </p:spTgt>
@@ -20604,33 +20438,15 @@
                                   </p:childTnLst>
                                 </p:cTn>
                               </p:par>
-                            </p:childTnLst>
-                          </p:cTn>
-                        </p:par>
-                      </p:childTnLst>
-                    </p:cTn>
-                  </p:par>
-                  <p:par>
-                    <p:cTn id="15" fill="hold">
-                      <p:stCondLst>
-                        <p:cond delay="indefinite"/>
-                      </p:stCondLst>
-                      <p:childTnLst>
-                        <p:par>
-                          <p:cTn id="16" fill="hold">
-                            <p:stCondLst>
-                              <p:cond delay="0"/>
-                            </p:stCondLst>
-                            <p:childTnLst>
                               <p:par>
-                                <p:cTn id="17" presetID="1" presetClass="entr" presetSubtype="0" fill="hold" nodeType="clickEffect">
+                                <p:cTn id="7" presetID="1" presetClass="entr" presetSubtype="0" fill="hold" nodeType="withEffect">
                                   <p:stCondLst>
                                     <p:cond delay="0"/>
                                   </p:stCondLst>
                                   <p:childTnLst>
                                     <p:set>
                                       <p:cBhvr>
-                                        <p:cTn id="18" dur="1" fill="hold">
+                                        <p:cTn id="8" dur="1" fill="hold">
                                           <p:stCondLst>
                                             <p:cond delay="0"/>
                                           </p:stCondLst>
@@ -20639,55 +20455,6 @@
                                           <p:spTgt spid="15">
                                             <p:txEl>
                                               <p:pRg st="4" end="4"/>
-                                            </p:txEl>
-                                          </p:spTgt>
-                                        </p:tgtEl>
-                                        <p:attrNameLst>
-                                          <p:attrName>style.visibility</p:attrName>
-                                        </p:attrNameLst>
-                                      </p:cBhvr>
-                                      <p:to>
-                                        <p:strVal val="visible"/>
-                                      </p:to>
-                                    </p:set>
-                                  </p:childTnLst>
-                                </p:cTn>
-                              </p:par>
-                            </p:childTnLst>
-                          </p:cTn>
-                        </p:par>
-                      </p:childTnLst>
-                    </p:cTn>
-                  </p:par>
-                  <p:par>
-                    <p:cTn id="19" fill="hold">
-                      <p:stCondLst>
-                        <p:cond delay="indefinite"/>
-                      </p:stCondLst>
-                      <p:childTnLst>
-                        <p:par>
-                          <p:cTn id="20" fill="hold">
-                            <p:stCondLst>
-                              <p:cond delay="0"/>
-                            </p:stCondLst>
-                            <p:childTnLst>
-                              <p:par>
-                                <p:cTn id="21" presetID="1" presetClass="entr" presetSubtype="0" fill="hold" nodeType="clickEffect">
-                                  <p:stCondLst>
-                                    <p:cond delay="0"/>
-                                  </p:stCondLst>
-                                  <p:childTnLst>
-                                    <p:set>
-                                      <p:cBhvr>
-                                        <p:cTn id="22" dur="1" fill="hold">
-                                          <p:stCondLst>
-                                            <p:cond delay="0"/>
-                                          </p:stCondLst>
-                                        </p:cTn>
-                                        <p:tgtEl>
-                                          <p:spTgt spid="15">
-                                            <p:txEl>
-                                              <p:pRg st="5" end="5"/>
                                             </p:txEl>
                                           </p:spTgt>
                                         </p:tgtEl>
@@ -21132,9 +20899,21 @@
             <a:pPr marL="514196" indent="-514196"/>
             <a:r>
               <a:rPr lang="bg-BG" dirty="0"/>
-              <a:t>Генериране на 0/1 вектори</a:t>
-            </a:r>
-            <a:endParaRPr lang="en-US" dirty="0"/>
+              <a:t>Генериране на </a:t>
+            </a:r>
+            <a:r>
+              <a:rPr lang="bg-BG" b="1" dirty="0">
+                <a:solidFill>
+                  <a:schemeClr val="bg1"/>
+                </a:solidFill>
+              </a:rPr>
+              <a:t>0/1 вектори</a:t>
+            </a:r>
+            <a:endParaRPr lang="en-US" b="1" dirty="0">
+              <a:solidFill>
+                <a:schemeClr val="bg1"/>
+              </a:solidFill>
+            </a:endParaRPr>
           </a:p>
           <a:p>
             <a:pPr marL="514196" indent="-514196">
@@ -21142,6 +20921,14 @@
                 <a:schemeClr val="tx1"/>
               </a:buClr>
             </a:pPr>
+            <a:r>
+              <a:rPr lang="en-US" dirty="0">
+                <a:solidFill>
+                  <a:schemeClr val="bg1"/>
+                </a:solidFill>
+              </a:rPr>
+              <a:t>͏</a:t>
+            </a:r>
             <a:r>
               <a:rPr lang="bg-BG" b="1" dirty="0">
                 <a:solidFill>
@@ -21150,47 +20937,43 @@
               </a:rPr>
               <a:t>Обратно връщане</a:t>
             </a:r>
-            <a:r>
-              <a:rPr lang="en-US" dirty="0"/>
-              <a:t>: </a:t>
-            </a:r>
+            <a:endParaRPr lang="en-US" dirty="0"/>
+          </a:p>
+          <a:p>
+            <a:pPr marL="803429" lvl="1" indent="-514196">
+              <a:buClr>
+                <a:schemeClr val="tx1"/>
+              </a:buClr>
+            </a:pPr>
             <a:r>
               <a:rPr lang="bg-BG" dirty="0"/>
-              <a:t>Концепции</a:t>
-            </a:r>
-            <a:endParaRPr lang="en-US" dirty="0"/>
-          </a:p>
-          <a:p>
+              <a:t>Същност</a:t>
+            </a:r>
+          </a:p>
+          <a:p>
+            <a:pPr marL="803429" lvl="1" indent="-514196">
+              <a:buClr>
+                <a:schemeClr val="tx1"/>
+              </a:buClr>
+            </a:pPr>
             <a:r>
               <a:rPr lang="bg-BG" dirty="0"/>
-              <a:t>Обратно връщане:</a:t>
-            </a:r>
-            <a:r>
-              <a:rPr lang="en-US" dirty="0"/>
-              <a:t> </a:t>
-            </a:r>
-            <a:r>
-              <a:rPr lang="bg-BG" dirty="0"/>
-              <a:t>Примери</a:t>
-            </a:r>
-            <a:endParaRPr lang="en-US" dirty="0"/>
-          </a:p>
-          <a:p>
-            <a:pPr lvl="1"/>
-            <a:r>
-              <a:rPr lang="bg-BG" sz="3600" dirty="0"/>
+              <a:t>Пример: </a:t>
+            </a:r>
+            <a:r>
+              <a:rPr lang="bg-BG" sz="3200" dirty="0"/>
               <a:t>Пъзелът</a:t>
             </a:r>
             <a:r>
-              <a:rPr lang="en-US" sz="3600" dirty="0"/>
-              <a:t> „</a:t>
-            </a:r>
-            <a:r>
-              <a:rPr lang="bg-BG" sz="3600" dirty="0"/>
+              <a:rPr lang="en-US" sz="3200" dirty="0"/>
+              <a:t> "</a:t>
+            </a:r>
+            <a:r>
+              <a:rPr lang="bg-BG" sz="3200" b="1" dirty="0"/>
               <a:t>8 кралици</a:t>
             </a:r>
             <a:r>
-              <a:rPr lang="en-US" sz="3600" dirty="0"/>
+              <a:rPr lang="en-US" sz="3200" dirty="0"/>
               <a:t>"</a:t>
             </a:r>
             <a:endParaRPr lang="en-US" dirty="0"/>
@@ -21423,33 +21206,15 @@
                                   </p:childTnLst>
                                 </p:cTn>
                               </p:par>
-                            </p:childTnLst>
-                          </p:cTn>
-                        </p:par>
-                      </p:childTnLst>
-                    </p:cTn>
-                  </p:par>
-                  <p:par>
-                    <p:cTn id="7" fill="hold">
-                      <p:stCondLst>
-                        <p:cond delay="indefinite"/>
-                      </p:stCondLst>
-                      <p:childTnLst>
-                        <p:par>
-                          <p:cTn id="8" fill="hold">
-                            <p:stCondLst>
-                              <p:cond delay="0"/>
-                            </p:stCondLst>
-                            <p:childTnLst>
                               <p:par>
-                                <p:cTn id="9" presetID="1" presetClass="entr" presetSubtype="0" fill="hold" nodeType="clickEffect">
+                                <p:cTn id="7" presetID="1" presetClass="entr" presetSubtype="0" fill="hold" nodeType="withEffect">
                                   <p:stCondLst>
                                     <p:cond delay="0"/>
                                   </p:stCondLst>
                                   <p:childTnLst>
                                     <p:set>
                                       <p:cBhvr>
-                                        <p:cTn id="10" dur="1" fill="hold">
+                                        <p:cTn id="8" dur="1" fill="hold">
                                           <p:stCondLst>
                                             <p:cond delay="0"/>
                                           </p:stCondLst>
@@ -21479,26 +21244,26 @@
                     </p:cTn>
                   </p:par>
                   <p:par>
-                    <p:cTn id="11" fill="hold">
+                    <p:cTn id="9" fill="hold">
                       <p:stCondLst>
                         <p:cond delay="indefinite"/>
                       </p:stCondLst>
                       <p:childTnLst>
                         <p:par>
-                          <p:cTn id="12" fill="hold">
+                          <p:cTn id="10" fill="hold">
                             <p:stCondLst>
                               <p:cond delay="0"/>
                             </p:stCondLst>
                             <p:childTnLst>
                               <p:par>
-                                <p:cTn id="13" presetID="1" presetClass="entr" presetSubtype="0" fill="hold" nodeType="clickEffect">
+                                <p:cTn id="11" presetID="1" presetClass="entr" presetSubtype="0" fill="hold" nodeType="clickEffect">
                                   <p:stCondLst>
                                     <p:cond delay="0"/>
                                   </p:stCondLst>
                                   <p:childTnLst>
                                     <p:set>
                                       <p:cBhvr>
-                                        <p:cTn id="14" dur="1" fill="hold">
+                                        <p:cTn id="12" dur="1" fill="hold">
                                           <p:stCondLst>
                                             <p:cond delay="0"/>
                                           </p:stCondLst>
@@ -21984,7 +21749,7 @@
           <a:p>
             <a:r>
               <a:rPr lang="bg-BG" sz="3399" dirty="0"/>
-              <a:t>Как да генерираме всички 8-бита вектори чрез </a:t>
+              <a:t>Как да генерираме всички 8-битови вектори чрез </a:t>
             </a:r>
             <a:r>
               <a:rPr lang="bg-BG" sz="3399" b="1" dirty="0">
@@ -22370,7 +22135,9 @@
         </p:nvSpPr>
         <p:spPr/>
         <p:txBody>
-          <a:bodyPr/>
+          <a:bodyPr>
+            <a:normAutofit/>
+          </a:bodyPr>
           <a:lstStyle/>
           <a:p>
             <a:pPr>
@@ -22379,18 +22146,18 @@
               </a:lnSpc>
             </a:pPr>
             <a:r>
-              <a:rPr lang="bg-BG" sz="3600" dirty="0"/>
+              <a:rPr lang="bg-BG" sz="3200" dirty="0"/>
               <a:t>Започваме с </a:t>
             </a:r>
             <a:r>
-              <a:rPr lang="bg-BG" sz="3600" b="1" dirty="0">
+              <a:rPr lang="bg-BG" sz="3200" b="1" dirty="0">
                 <a:solidFill>
                   <a:schemeClr val="bg1"/>
                 </a:solidFill>
               </a:rPr>
               <a:t>празен вектор</a:t>
             </a:r>
-            <a:endParaRPr lang="en-GB" sz="3600" b="1" dirty="0">
+            <a:endParaRPr lang="en-GB" sz="3200" b="1" dirty="0">
               <a:solidFill>
                 <a:schemeClr val="bg1"/>
               </a:solidFill>
@@ -22410,13 +22177,16 @@
               <a:lnSpc>
                 <a:spcPct val="100000"/>
               </a:lnSpc>
+              <a:spcBef>
+                <a:spcPts val="3000"/>
+              </a:spcBef>
             </a:pPr>
             <a:r>
-              <a:rPr lang="bg-BG" sz="2800" dirty="0"/>
+              <a:rPr lang="bg-BG" sz="3200" dirty="0"/>
               <a:t>Избираме </a:t>
             </a:r>
             <a:r>
-              <a:rPr lang="bg-BG" sz="2800" b="1" dirty="0">
+              <a:rPr lang="bg-BG" sz="3200" b="1" dirty="0">
                 <a:solidFill>
                   <a:schemeClr val="bg1"/>
                 </a:solidFill>
@@ -22424,7 +22194,7 @@
               <a:t>първата позиция</a:t>
             </a:r>
             <a:r>
-              <a:rPr lang="en-GB" sz="2800" b="1" dirty="0">
+              <a:rPr lang="en-GB" sz="3200" b="1" dirty="0">
                 <a:solidFill>
                   <a:schemeClr val="bg1"/>
                 </a:solidFill>
@@ -22432,22 +22202,22 @@
               <a:t> </a:t>
             </a:r>
             <a:r>
-              <a:rPr lang="bg-BG" sz="2800" dirty="0"/>
+              <a:rPr lang="bg-BG" sz="3200" dirty="0"/>
               <a:t>и</a:t>
             </a:r>
             <a:r>
-              <a:rPr lang="en-GB" sz="2800" dirty="0"/>
+              <a:rPr lang="en-GB" sz="3200" dirty="0"/>
               <a:t> </a:t>
             </a:r>
             <a:r>
-              <a:rPr lang="bg-BG" sz="2800" b="1" dirty="0">
+              <a:rPr lang="bg-BG" sz="3200" b="1" dirty="0">
                 <a:solidFill>
                   <a:schemeClr val="bg1"/>
                 </a:solidFill>
               </a:rPr>
               <a:t>минаваме през всички възможности</a:t>
             </a:r>
-            <a:endParaRPr lang="en-GB" sz="3600" dirty="0"/>
+            <a:endParaRPr lang="en-GB" sz="3200" dirty="0"/>
           </a:p>
           <a:p>
             <a:pPr>
@@ -22458,33 +22228,29 @@
             <a:endParaRPr lang="bg-BG" sz="3600" dirty="0"/>
           </a:p>
           <a:p>
+            <a:pPr marL="0" indent="0">
+              <a:lnSpc>
+                <a:spcPct val="100000"/>
+              </a:lnSpc>
+              <a:buNone/>
+            </a:pPr>
+            <a:endParaRPr lang="en-GB" sz="3600" dirty="0"/>
+          </a:p>
+          <a:p>
             <a:pPr>
               <a:lnSpc>
                 <a:spcPct val="100000"/>
               </a:lnSpc>
+              <a:spcBef>
+                <a:spcPts val="3000"/>
+              </a:spcBef>
             </a:pPr>
-            <a:endParaRPr lang="en-GB" sz="3600" dirty="0"/>
-          </a:p>
-          <a:p>
-            <a:pPr>
-              <a:lnSpc>
-                <a:spcPct val="100000"/>
-              </a:lnSpc>
-            </a:pPr>
-            <a:endParaRPr lang="en-GB" sz="3600" dirty="0"/>
-          </a:p>
-          <a:p>
-            <a:pPr>
-              <a:lnSpc>
-                <a:spcPct val="100000"/>
-              </a:lnSpc>
-            </a:pPr>
-            <a:r>
-              <a:rPr lang="bg-BG" sz="3600" dirty="0"/>
+            <a:r>
+              <a:rPr lang="bg-BG" sz="3200" dirty="0"/>
               <a:t>За всяка възможност генерирайте всички </a:t>
             </a:r>
             <a:r>
-              <a:rPr lang="en-US" sz="3600" b="1" dirty="0">
+              <a:rPr lang="en-US" sz="3200" b="1" dirty="0">
                 <a:solidFill>
                   <a:schemeClr val="bg1"/>
                 </a:solidFill>
@@ -22492,14 +22258,14 @@
               <a:t>(n-1)</a:t>
             </a:r>
             <a:r>
-              <a:rPr lang="en-US" sz="3600" dirty="0"/>
+              <a:rPr lang="en-US" sz="3200" dirty="0"/>
               <a:t>-</a:t>
             </a:r>
             <a:r>
-              <a:rPr lang="bg-BG" sz="3600" dirty="0"/>
+              <a:rPr lang="bg-BG" sz="3200" dirty="0"/>
               <a:t>бита вектори</a:t>
             </a:r>
-            <a:endParaRPr lang="en-US" dirty="0"/>
+            <a:endParaRPr lang="en-US" sz="3200" dirty="0"/>
           </a:p>
         </p:txBody>
       </p:sp>
@@ -22542,7 +22308,7 @@
         </p:nvSpPr>
         <p:spPr bwMode="auto">
           <a:xfrm rot="16200000">
-            <a:off x="3101608" y="2765566"/>
+            <a:off x="3101608" y="3131262"/>
             <a:ext cx="287262" cy="3468438"/>
           </a:xfrm>
           <a:prstGeom prst="leftBrace">
@@ -22609,7 +22375,7 @@
         </p:nvSpPr>
         <p:spPr bwMode="auto">
           <a:xfrm rot="16200000">
-            <a:off x="9084861" y="2810381"/>
+            <a:off x="8826702" y="3176077"/>
             <a:ext cx="287262" cy="3378811"/>
           </a:xfrm>
           <a:prstGeom prst="leftBrace">
@@ -22674,7 +22440,7 @@
         </p:nvSpPr>
         <p:spPr>
           <a:xfrm>
-            <a:off x="2808433" y="4741889"/>
+            <a:off x="2808433" y="5107585"/>
             <a:ext cx="889755" cy="400006"/>
           </a:xfrm>
           <a:prstGeom prst="rect">
@@ -22712,7 +22478,7 @@
         </p:nvSpPr>
         <p:spPr>
           <a:xfrm>
-            <a:off x="8791686" y="4702332"/>
+            <a:off x="8533527" y="5068028"/>
             <a:ext cx="889755" cy="400006"/>
           </a:xfrm>
           <a:prstGeom prst="rect">
@@ -22941,10 +22707,16 @@
           <p:cNvGraphicFramePr>
             <a:graphicFrameLocks noGrp="1"/>
           </p:cNvGraphicFramePr>
-          <p:nvPr/>
+          <p:nvPr>
+            <p:extLst>
+              <p:ext uri="{D42A27DB-BD31-4B8C-83A1-F6EECF244321}">
+                <p14:modId xmlns:p14="http://schemas.microsoft.com/office/powerpoint/2010/main" val="3077067356"/>
+              </p:ext>
+            </p:extLst>
+          </p:nvPr>
         </p:nvGraphicFramePr>
         <p:xfrm>
-          <a:off x="1016095" y="3738304"/>
+          <a:off x="1016095" y="4104000"/>
           <a:ext cx="3980992" cy="457176"/>
         </p:xfrm>
         <a:graphic>
@@ -23140,10 +22912,16 @@
           <p:cNvGraphicFramePr>
             <a:graphicFrameLocks noGrp="1"/>
           </p:cNvGraphicFramePr>
-          <p:nvPr/>
+          <p:nvPr>
+            <p:extLst>
+              <p:ext uri="{D42A27DB-BD31-4B8C-83A1-F6EECF244321}">
+                <p14:modId xmlns:p14="http://schemas.microsoft.com/office/powerpoint/2010/main" val="2652245869"/>
+              </p:ext>
+            </p:extLst>
+          </p:nvPr>
         </p:nvGraphicFramePr>
         <p:xfrm>
-          <a:off x="6958147" y="3738304"/>
+          <a:off x="6699988" y="4104000"/>
           <a:ext cx="3980992" cy="457176"/>
         </p:xfrm>
         <a:graphic>
@@ -23347,7 +23125,7 @@
         </p:nvSpPr>
         <p:spPr>
           <a:xfrm>
-            <a:off x="1016095" y="6320612"/>
+            <a:off x="991047" y="6357269"/>
             <a:ext cx="10209905" cy="399981"/>
           </a:xfrm>
           <a:prstGeom prst="rect">
@@ -23466,7 +23244,31 @@
                 <a:ea typeface="+mn-ea"/>
                 <a:cs typeface="+mn-cs"/>
               </a:rPr>
-              <a:t>Тествайте решението в Judge</a:t>
+              <a:t>Тествайте решението</a:t>
+            </a:r>
+            <a:r>
+              <a:rPr lang="bg-BG" sz="1800" kern="1200" dirty="0">
+                <a:solidFill>
+                  <a:srgbClr val="234465"/>
+                </a:solidFill>
+                <a:effectLst/>
+                <a:latin typeface="Calibri" panose="020F0502020204030204" pitchFamily="34" charset="0"/>
+                <a:ea typeface="+mn-ea"/>
+                <a:cs typeface="+mn-cs"/>
+              </a:rPr>
+              <a:t> си</a:t>
+            </a:r>
+            <a:r>
+              <a:rPr lang="en-US" sz="1800" kern="1200" dirty="0">
+                <a:solidFill>
+                  <a:srgbClr val="234465"/>
+                </a:solidFill>
+                <a:effectLst/>
+                <a:latin typeface="Calibri" panose="020F0502020204030204" pitchFamily="34" charset="0"/>
+                <a:ea typeface="+mn-ea"/>
+                <a:cs typeface="+mn-cs"/>
+              </a:rPr>
+              <a:t> в Judge</a:t>
             </a:r>
             <a:r>
               <a:rPr lang="en-US" sz="1999" dirty="0"/>
@@ -23782,7 +23584,7 @@
                                         <p:tgtEl>
                                           <p:spTgt spid="2">
                                             <p:txEl>
-                                              <p:pRg st="6" end="6"/>
+                                              <p:pRg st="5" end="5"/>
                                             </p:txEl>
                                           </p:spTgt>
                                         </p:tgtEl>
@@ -24358,18 +24160,10 @@
           <a:lstStyle/>
           <a:p>
             <a:r>
-              <a:rPr lang="ru-RU" sz="2800" dirty="0"/>
-              <a:t>Генериране на 3-битови вектори: </a:t>
-            </a:r>
-            <a:r>
-              <a:rPr lang="ru-RU" sz="2800" dirty="0" err="1"/>
-              <a:t>дърво</a:t>
-            </a:r>
-            <a:r>
-              <a:rPr lang="ru-RU" sz="2800" dirty="0"/>
-              <a:t> на рекурсия</a:t>
-            </a:r>
-            <a:endParaRPr lang="bg-BG" sz="2800" dirty="0"/>
+              <a:rPr lang="ru-RU" sz="3200" dirty="0"/>
+              <a:t>Генериране на 3-битови вектори: рекурсивно дърво</a:t>
+            </a:r>
+            <a:endParaRPr lang="bg-BG" sz="3200" dirty="0"/>
           </a:p>
         </p:txBody>
       </p:sp>
@@ -28688,7 +28482,7 @@
           <p:nvPr>
             <p:extLst>
               <p:ext uri="{D42A27DB-BD31-4B8C-83A1-F6EECF244321}">
-                <p14:modId xmlns:p14="http://schemas.microsoft.com/office/powerpoint/2010/main" val="3180371309"/>
+                <p14:modId xmlns:p14="http://schemas.microsoft.com/office/powerpoint/2010/main" val="1099751575"/>
               </p:ext>
             </p:extLst>
           </p:nvPr>
@@ -28761,28 +28555,22 @@
           <a:bodyPr/>
           <a:lstStyle/>
           <a:p>
-            <a:r>
-              <a:rPr lang="bg-BG" sz="3600" dirty="0"/>
-              <a:t>Какво е </a:t>
-            </a:r>
-            <a:r>
-              <a:rPr lang="bg-BG" sz="3600" b="1" dirty="0">
+            <a:pPr lvl="1">
+              <a:buClr>
+                <a:schemeClr val="tx1"/>
+              </a:buClr>
+            </a:pPr>
+            <a:r>
+              <a:rPr lang="bg-BG" sz="3400" b="1" dirty="0">
                 <a:solidFill>
                   <a:schemeClr val="bg1"/>
                 </a:solidFill>
               </a:rPr>
-              <a:t>обратно връщане</a:t>
-            </a:r>
-            <a:r>
-              <a:rPr lang="en-US" sz="3600" dirty="0"/>
-              <a:t>?</a:t>
-            </a:r>
-          </a:p>
-          <a:p>
-            <a:pPr lvl="1"/>
+              <a:t>Обратно връщане</a:t>
+            </a:r>
             <a:r>
               <a:rPr lang="bg-BG" sz="3400" dirty="0"/>
-              <a:t>Клас от алгоритмите за </a:t>
+              <a:t> == клас от алгоритмите за </a:t>
             </a:r>
             <a:r>
               <a:rPr lang="bg-BG" sz="3400" b="1" dirty="0">
@@ -28798,7 +28586,23 @@
             <a:pPr lvl="2"/>
             <a:r>
               <a:rPr lang="bg-BG" sz="3200" dirty="0"/>
-              <a:t>Примерно: намиране на всички възможни пътища от начална до крайна точка</a:t>
+              <a:t>Пример: намиране на </a:t>
+            </a:r>
+            <a:r>
+              <a:rPr lang="bg-BG" sz="3200" b="1" dirty="0">
+                <a:solidFill>
+                  <a:schemeClr val="bg1"/>
+                </a:solidFill>
+              </a:rPr>
+              <a:t>всички възможни пътища</a:t>
+            </a:r>
+            <a:r>
+              <a:rPr lang="bg-BG" sz="3200" b="1" dirty="0"/>
+              <a:t> </a:t>
+            </a:r>
+            <a:r>
+              <a:rPr lang="bg-BG" sz="3200" dirty="0"/>
+              <a:t>от начална до крайна точка</a:t>
             </a:r>
             <a:endParaRPr lang="en-US" sz="3200" dirty="0"/>
           </a:p>
@@ -29029,7 +28833,7 @@
                                         <p:tgtEl>
                                           <p:spTgt spid="6">
                                             <p:txEl>
-                                              <p:pRg st="1" end="1"/>
+                                              <p:pRg st="0" end="0"/>
                                             </p:txEl>
                                           </p:spTgt>
                                         </p:tgtEl>
@@ -29078,7 +28882,7 @@
                                         <p:tgtEl>
                                           <p:spTgt spid="6">
                                             <p:txEl>
-                                              <p:pRg st="2" end="2"/>
+                                              <p:pRg st="1" end="1"/>
                                             </p:txEl>
                                           </p:spTgt>
                                         </p:tgtEl>

</xml_diff>